<commit_message>
commit after TAM workshop 2016-01-19
</commit_message>
<xml_diff>
--- a/training/03_Jerry_Fiori.pptx
+++ b/training/03_Jerry_Fiori.pptx
@@ -5,23 +5,24 @@
     <p:sldMasterId id="2147483660" r:id="rId1"/>
   </p:sldMasterIdLst>
   <p:notesMasterIdLst>
-    <p:notesMasterId r:id="rId13"/>
+    <p:notesMasterId r:id="rId14"/>
   </p:notesMasterIdLst>
   <p:handoutMasterIdLst>
-    <p:handoutMasterId r:id="rId14"/>
+    <p:handoutMasterId r:id="rId15"/>
   </p:handoutMasterIdLst>
   <p:sldIdLst>
     <p:sldId id="340" r:id="rId2"/>
-    <p:sldId id="368" r:id="rId3"/>
-    <p:sldId id="369" r:id="rId4"/>
-    <p:sldId id="360" r:id="rId5"/>
-    <p:sldId id="361" r:id="rId6"/>
-    <p:sldId id="362" r:id="rId7"/>
-    <p:sldId id="363" r:id="rId8"/>
-    <p:sldId id="364" r:id="rId9"/>
-    <p:sldId id="365" r:id="rId10"/>
-    <p:sldId id="366" r:id="rId11"/>
-    <p:sldId id="367" r:id="rId12"/>
+    <p:sldId id="370" r:id="rId3"/>
+    <p:sldId id="368" r:id="rId4"/>
+    <p:sldId id="369" r:id="rId5"/>
+    <p:sldId id="360" r:id="rId6"/>
+    <p:sldId id="361" r:id="rId7"/>
+    <p:sldId id="362" r:id="rId8"/>
+    <p:sldId id="363" r:id="rId9"/>
+    <p:sldId id="364" r:id="rId10"/>
+    <p:sldId id="365" r:id="rId11"/>
+    <p:sldId id="366" r:id="rId12"/>
+    <p:sldId id="367" r:id="rId13"/>
   </p:sldIdLst>
   <p:sldSz cx="12195175" cy="6859588"/>
   <p:notesSz cx="6797675" cy="9874250"/>
@@ -150,6 +151,7 @@
         <p14:section name="Default Section" id="{76EA4576-18E6-44A1-968C-BAC47FDF7855}">
           <p14:sldIdLst>
             <p14:sldId id="340"/>
+            <p14:sldId id="370"/>
             <p14:sldId id="368"/>
             <p14:sldId id="369"/>
             <p14:sldId id="360"/>
@@ -657,6 +659,198 @@
     <p:extLst>
       <p:ext uri="{BB962C8B-B14F-4D97-AF65-F5344CB8AC3E}">
         <p14:creationId xmlns:p14="http://schemas.microsoft.com/office/powerpoint/2010/main" val="2156403882"/>
+      </p:ext>
+    </p:extLst>
+  </p:cSld>
+  <p:clrMapOvr>
+    <a:masterClrMapping/>
+  </p:clrMapOvr>
+</p:notes>
+</file>
+
+<file path=ppt/notesSlides/notesSlide2.xml><?xml version="1.0" encoding="utf-8"?>
+<p:notes xmlns:a="http://schemas.openxmlformats.org/drawingml/2006/main" xmlns:r="http://schemas.openxmlformats.org/officeDocument/2006/relationships" xmlns:p="http://schemas.openxmlformats.org/presentationml/2006/main">
+  <p:cSld>
+    <p:spTree>
+      <p:nvGrpSpPr>
+        <p:cNvPr id="1" name=""/>
+        <p:cNvGrpSpPr/>
+        <p:nvPr/>
+      </p:nvGrpSpPr>
+      <p:grpSpPr>
+        <a:xfrm>
+          <a:off x="0" y="0"/>
+          <a:ext cx="0" cy="0"/>
+          <a:chOff x="0" y="0"/>
+          <a:chExt cx="0" cy="0"/>
+        </a:xfrm>
+      </p:grpSpPr>
+      <p:sp>
+        <p:nvSpPr>
+          <p:cNvPr id="2" name="Slide Image Placeholder 1"/>
+          <p:cNvSpPr>
+            <a:spLocks noGrp="1" noRot="1" noChangeAspect="1"/>
+          </p:cNvSpPr>
+          <p:nvPr>
+            <p:ph type="sldImg"/>
+          </p:nvPr>
+        </p:nvSpPr>
+        <p:spPr/>
+      </p:sp>
+      <p:sp>
+        <p:nvSpPr>
+          <p:cNvPr id="3" name="Notes Placeholder 2"/>
+          <p:cNvSpPr>
+            <a:spLocks noGrp="1"/>
+          </p:cNvSpPr>
+          <p:nvPr>
+            <p:ph type="body" idx="1"/>
+          </p:nvPr>
+        </p:nvSpPr>
+        <p:spPr/>
+        <p:txBody>
+          <a:bodyPr/>
+          <a:lstStyle/>
+          <a:p>
+            <a:r>
+              <a:rPr lang="en-US" dirty="0" smtClean="0"/>
+              <a:t>Gateway</a:t>
+            </a:r>
+            <a:r>
+              <a:rPr lang="en-US" baseline="0" dirty="0" smtClean="0"/>
+              <a:t> frontend add-on: request route / dispatch. </a:t>
+            </a:r>
+          </a:p>
+          <a:p>
+            <a:r>
+              <a:rPr lang="en-US" baseline="0" dirty="0" smtClean="0"/>
+              <a:t>Sales manager – sales representative – Asian, European, American </a:t>
+            </a:r>
+            <a:endParaRPr lang="en-US" dirty="0"/>
+          </a:p>
+        </p:txBody>
+      </p:sp>
+      <p:sp>
+        <p:nvSpPr>
+          <p:cNvPr id="4" name="Slide Number Placeholder 3"/>
+          <p:cNvSpPr>
+            <a:spLocks noGrp="1"/>
+          </p:cNvSpPr>
+          <p:nvPr>
+            <p:ph type="sldNum" sz="quarter" idx="10"/>
+          </p:nvPr>
+        </p:nvSpPr>
+        <p:spPr/>
+        <p:txBody>
+          <a:bodyPr/>
+          <a:lstStyle/>
+          <a:p>
+            <a:fld id="{7D8C2C35-2B8A-446E-BEC0-FD36716C29AC}" type="slidenum">
+              <a:rPr lang="de-DE" smtClean="0"/>
+              <a:pPr/>
+              <a:t>2</a:t>
+            </a:fld>
+            <a:endParaRPr lang="de-DE" dirty="0"/>
+          </a:p>
+        </p:txBody>
+      </p:sp>
+    </p:spTree>
+    <p:extLst>
+      <p:ext uri="{BB962C8B-B14F-4D97-AF65-F5344CB8AC3E}">
+        <p14:creationId xmlns:p14="http://schemas.microsoft.com/office/powerpoint/2010/main" val="294951601"/>
+      </p:ext>
+    </p:extLst>
+  </p:cSld>
+  <p:clrMapOvr>
+    <a:masterClrMapping/>
+  </p:clrMapOvr>
+</p:notes>
+</file>
+
+<file path=ppt/notesSlides/notesSlide3.xml><?xml version="1.0" encoding="utf-8"?>
+<p:notes xmlns:a="http://schemas.openxmlformats.org/drawingml/2006/main" xmlns:r="http://schemas.openxmlformats.org/officeDocument/2006/relationships" xmlns:p="http://schemas.openxmlformats.org/presentationml/2006/main">
+  <p:cSld>
+    <p:spTree>
+      <p:nvGrpSpPr>
+        <p:cNvPr id="1" name=""/>
+        <p:cNvGrpSpPr/>
+        <p:nvPr/>
+      </p:nvGrpSpPr>
+      <p:grpSpPr>
+        <a:xfrm>
+          <a:off x="0" y="0"/>
+          <a:ext cx="0" cy="0"/>
+          <a:chOff x="0" y="0"/>
+          <a:chExt cx="0" cy="0"/>
+        </a:xfrm>
+      </p:grpSpPr>
+      <p:sp>
+        <p:nvSpPr>
+          <p:cNvPr id="2" name="Slide Image Placeholder 1"/>
+          <p:cNvSpPr>
+            <a:spLocks noGrp="1" noRot="1" noChangeAspect="1"/>
+          </p:cNvSpPr>
+          <p:nvPr>
+            <p:ph type="sldImg"/>
+          </p:nvPr>
+        </p:nvSpPr>
+        <p:spPr/>
+      </p:sp>
+      <p:sp>
+        <p:nvSpPr>
+          <p:cNvPr id="3" name="Notes Placeholder 2"/>
+          <p:cNvSpPr>
+            <a:spLocks noGrp="1"/>
+          </p:cNvSpPr>
+          <p:nvPr>
+            <p:ph type="body" idx="1"/>
+          </p:nvPr>
+        </p:nvSpPr>
+        <p:spPr/>
+        <p:txBody>
+          <a:bodyPr/>
+          <a:lstStyle/>
+          <a:p>
+            <a:r>
+              <a:rPr lang="en-US" dirty="0" smtClean="0"/>
+              <a:t>2016-01-18 16:44PM</a:t>
+            </a:r>
+            <a:r>
+              <a:rPr lang="en-US" baseline="0" dirty="0" smtClean="0"/>
+              <a:t> confirmed by Jerry – this screenshot is done in Gateway system</a:t>
+            </a:r>
+            <a:endParaRPr lang="en-US" dirty="0"/>
+          </a:p>
+        </p:txBody>
+      </p:sp>
+      <p:sp>
+        <p:nvSpPr>
+          <p:cNvPr id="4" name="Slide Number Placeholder 3"/>
+          <p:cNvSpPr>
+            <a:spLocks noGrp="1"/>
+          </p:cNvSpPr>
+          <p:nvPr>
+            <p:ph type="sldNum" sz="quarter" idx="10"/>
+          </p:nvPr>
+        </p:nvSpPr>
+        <p:spPr/>
+        <p:txBody>
+          <a:bodyPr/>
+          <a:lstStyle/>
+          <a:p>
+            <a:fld id="{7D8C2C35-2B8A-446E-BEC0-FD36716C29AC}" type="slidenum">
+              <a:rPr lang="de-DE" smtClean="0"/>
+              <a:pPr/>
+              <a:t>11</a:t>
+            </a:fld>
+            <a:endParaRPr lang="de-DE" dirty="0"/>
+          </a:p>
+        </p:txBody>
+      </p:sp>
+    </p:spTree>
+    <p:extLst>
+      <p:ext uri="{BB962C8B-B14F-4D97-AF65-F5344CB8AC3E}">
+        <p14:creationId xmlns:p14="http://schemas.microsoft.com/office/powerpoint/2010/main" val="843928628"/>
       </p:ext>
     </p:extLst>
   </p:cSld>
@@ -6919,7 +7113,7 @@
           <a:p>
             <a:r>
               <a:rPr lang="en-US" dirty="0" smtClean="0"/>
-              <a:t>4. Gateway Frontend Add-on converts response to JSON format</a:t>
+              <a:t>Response in ABAP Format</a:t>
             </a:r>
             <a:endParaRPr lang="en-US" dirty="0"/>
           </a:p>
@@ -6941,8 +7135,32 @@
         </p:blipFill>
         <p:spPr>
           <a:xfrm>
-            <a:off x="324000" y="1396539"/>
-            <a:ext cx="11209991" cy="3596952"/>
+            <a:off x="6366454" y="2253259"/>
+            <a:ext cx="4488569" cy="1562235"/>
+          </a:xfrm>
+          <a:prstGeom prst="rect">
+            <a:avLst/>
+          </a:prstGeom>
+        </p:spPr>
+      </p:pic>
+      <p:pic>
+        <p:nvPicPr>
+          <p:cNvPr id="6" name="Picture 5"/>
+          <p:cNvPicPr>
+            <a:picLocks noChangeAspect="1"/>
+          </p:cNvPicPr>
+          <p:nvPr/>
+        </p:nvPicPr>
+        <p:blipFill>
+          <a:blip r:embed="rId3"/>
+          <a:stretch>
+            <a:fillRect/>
+          </a:stretch>
+        </p:blipFill>
+        <p:spPr>
+          <a:xfrm>
+            <a:off x="324000" y="1575518"/>
+            <a:ext cx="5624047" cy="3337849"/>
           </a:xfrm>
           <a:prstGeom prst="rect">
             <a:avLst/>
@@ -6952,13 +7170,20 @@
     </p:spTree>
     <p:extLst>
       <p:ext uri="{BB962C8B-B14F-4D97-AF65-F5344CB8AC3E}">
-        <p14:creationId xmlns:p14="http://schemas.microsoft.com/office/powerpoint/2010/main" val="3192874088"/>
+        <p14:creationId xmlns:p14="http://schemas.microsoft.com/office/powerpoint/2010/main" val="252141420"/>
       </p:ext>
     </p:extLst>
   </p:cSld>
   <p:clrMapOvr>
     <a:masterClrMapping/>
   </p:clrMapOvr>
+  <p:timing>
+    <p:tnLst>
+      <p:par>
+        <p:cTn id="1" dur="indefinite" restart="never" nodeType="tmRoot"/>
+      </p:par>
+    </p:tnLst>
+  </p:timing>
 </p:sld>
 </file>
 
@@ -6995,6 +7220,90 @@
           <a:lstStyle/>
           <a:p>
             <a:r>
+              <a:rPr lang="en-US" dirty="0" smtClean="0"/>
+              <a:t>4. Gateway Frontend Add-on converts response to JSON format</a:t>
+            </a:r>
+            <a:endParaRPr lang="en-US" dirty="0"/>
+          </a:p>
+        </p:txBody>
+      </p:sp>
+      <p:pic>
+        <p:nvPicPr>
+          <p:cNvPr id="3" name="Picture 2"/>
+          <p:cNvPicPr>
+            <a:picLocks noChangeAspect="1"/>
+          </p:cNvPicPr>
+          <p:nvPr/>
+        </p:nvPicPr>
+        <p:blipFill>
+          <a:blip r:embed="rId3"/>
+          <a:stretch>
+            <a:fillRect/>
+          </a:stretch>
+        </p:blipFill>
+        <p:spPr>
+          <a:xfrm>
+            <a:off x="435436" y="1597025"/>
+            <a:ext cx="11324301" cy="3665538"/>
+          </a:xfrm>
+          <a:prstGeom prst="rect">
+            <a:avLst/>
+          </a:prstGeom>
+        </p:spPr>
+      </p:pic>
+    </p:spTree>
+    <p:extLst>
+      <p:ext uri="{BB962C8B-B14F-4D97-AF65-F5344CB8AC3E}">
+        <p14:creationId xmlns:p14="http://schemas.microsoft.com/office/powerpoint/2010/main" val="3192874088"/>
+      </p:ext>
+    </p:extLst>
+  </p:cSld>
+  <p:clrMapOvr>
+    <a:masterClrMapping/>
+  </p:clrMapOvr>
+  <p:timing>
+    <p:tnLst>
+      <p:par>
+        <p:cTn id="1" dur="indefinite" restart="never" nodeType="tmRoot"/>
+      </p:par>
+    </p:tnLst>
+  </p:timing>
+</p:sld>
+</file>
+
+<file path=ppt/slides/slide12.xml><?xml version="1.0" encoding="utf-8"?>
+<p:sld xmlns:a="http://schemas.openxmlformats.org/drawingml/2006/main" xmlns:r="http://schemas.openxmlformats.org/officeDocument/2006/relationships" xmlns:p="http://schemas.openxmlformats.org/presentationml/2006/main">
+  <p:cSld>
+    <p:spTree>
+      <p:nvGrpSpPr>
+        <p:cNvPr id="1" name=""/>
+        <p:cNvGrpSpPr/>
+        <p:nvPr/>
+      </p:nvGrpSpPr>
+      <p:grpSpPr>
+        <a:xfrm>
+          <a:off x="0" y="0"/>
+          <a:ext cx="0" cy="0"/>
+          <a:chOff x="0" y="0"/>
+          <a:chExt cx="0" cy="0"/>
+        </a:xfrm>
+      </p:grpSpPr>
+      <p:sp>
+        <p:nvSpPr>
+          <p:cNvPr id="2" name="Title 1"/>
+          <p:cNvSpPr>
+            <a:spLocks noGrp="1"/>
+          </p:cNvSpPr>
+          <p:nvPr>
+            <p:ph type="title"/>
+          </p:nvPr>
+        </p:nvSpPr>
+        <p:spPr/>
+        <p:txBody>
+          <a:bodyPr/>
+          <a:lstStyle/>
+          <a:p>
+            <a:r>
               <a:rPr lang="en-US" dirty="0"/>
               <a:t>4. Gateway Frontend Add-on converts response to JSON format</a:t>
             </a:r>
@@ -7035,10 +7344,105 @@
   <p:clrMapOvr>
     <a:masterClrMapping/>
   </p:clrMapOvr>
+  <p:timing>
+    <p:tnLst>
+      <p:par>
+        <p:cTn id="1" dur="indefinite" restart="never" nodeType="tmRoot"/>
+      </p:par>
+    </p:tnLst>
+  </p:timing>
 </p:sld>
 </file>
 
 <file path=ppt/slides/slide2.xml><?xml version="1.0" encoding="utf-8"?>
+<p:sld xmlns:a="http://schemas.openxmlformats.org/drawingml/2006/main" xmlns:r="http://schemas.openxmlformats.org/officeDocument/2006/relationships" xmlns:p="http://schemas.openxmlformats.org/presentationml/2006/main">
+  <p:cSld>
+    <p:spTree>
+      <p:nvGrpSpPr>
+        <p:cNvPr id="1" name=""/>
+        <p:cNvGrpSpPr/>
+        <p:nvPr/>
+      </p:nvGrpSpPr>
+      <p:grpSpPr>
+        <a:xfrm>
+          <a:off x="0" y="0"/>
+          <a:ext cx="0" cy="0"/>
+          <a:chOff x="0" y="0"/>
+          <a:chExt cx="0" cy="0"/>
+        </a:xfrm>
+      </p:grpSpPr>
+      <p:sp>
+        <p:nvSpPr>
+          <p:cNvPr id="2" name="Title 1"/>
+          <p:cNvSpPr>
+            <a:spLocks noGrp="1"/>
+          </p:cNvSpPr>
+          <p:nvPr>
+            <p:ph type="title"/>
+          </p:nvPr>
+        </p:nvSpPr>
+        <p:spPr/>
+        <p:txBody>
+          <a:bodyPr/>
+          <a:lstStyle/>
+          <a:p>
+            <a:r>
+              <a:rPr lang="en-US" altLang="zh-CN" dirty="0" smtClean="0"/>
+              <a:t>Fiori Architecture ( CRM </a:t>
+            </a:r>
+            <a:r>
+              <a:rPr lang="en-US" altLang="zh-CN" smtClean="0"/>
+              <a:t>on Premise )</a:t>
+            </a:r>
+            <a:endParaRPr lang="en-US" dirty="0"/>
+          </a:p>
+        </p:txBody>
+      </p:sp>
+      <p:pic>
+        <p:nvPicPr>
+          <p:cNvPr id="4" name="Picture 3"/>
+          <p:cNvPicPr>
+            <a:picLocks noChangeAspect="1"/>
+          </p:cNvPicPr>
+          <p:nvPr/>
+        </p:nvPicPr>
+        <p:blipFill>
+          <a:blip r:embed="rId3"/>
+          <a:stretch>
+            <a:fillRect/>
+          </a:stretch>
+        </p:blipFill>
+        <p:spPr>
+          <a:xfrm>
+            <a:off x="324000" y="1303020"/>
+            <a:ext cx="4956660" cy="5247358"/>
+          </a:xfrm>
+          <a:prstGeom prst="rect">
+            <a:avLst/>
+          </a:prstGeom>
+        </p:spPr>
+      </p:pic>
+    </p:spTree>
+    <p:extLst>
+      <p:ext uri="{BB962C8B-B14F-4D97-AF65-F5344CB8AC3E}">
+        <p14:creationId xmlns:p14="http://schemas.microsoft.com/office/powerpoint/2010/main" val="2084508045"/>
+      </p:ext>
+    </p:extLst>
+  </p:cSld>
+  <p:clrMapOvr>
+    <a:masterClrMapping/>
+  </p:clrMapOvr>
+  <p:timing>
+    <p:tnLst>
+      <p:par>
+        <p:cTn id="1" dur="indefinite" restart="never" nodeType="tmRoot"/>
+      </p:par>
+    </p:tnLst>
+  </p:timing>
+</p:sld>
+</file>
+
+<file path=ppt/slides/slide3.xml><?xml version="1.0" encoding="utf-8"?>
 <p:sld xmlns:a="http://schemas.openxmlformats.org/drawingml/2006/main" xmlns:r="http://schemas.openxmlformats.org/officeDocument/2006/relationships" xmlns:p="http://schemas.openxmlformats.org/presentationml/2006/main">
   <p:cSld>
     <p:spTree>
@@ -7283,7 +7687,7 @@
 </p:sld>
 </file>
 
-<file path=ppt/slides/slide3.xml><?xml version="1.0" encoding="utf-8"?>
+<file path=ppt/slides/slide4.xml><?xml version="1.0" encoding="utf-8"?>
 <p:sld xmlns:a="http://schemas.openxmlformats.org/drawingml/2006/main" xmlns:r="http://schemas.openxmlformats.org/officeDocument/2006/relationships" xmlns:p="http://schemas.openxmlformats.org/presentationml/2006/main">
   <p:cSld>
     <p:spTree>
@@ -7387,7 +7791,7 @@
         </p:blipFill>
         <p:spPr>
           <a:xfrm>
-            <a:off x="324000" y="3307569"/>
+            <a:off x="324000" y="2986710"/>
             <a:ext cx="4785775" cy="2270957"/>
           </a:xfrm>
           <a:prstGeom prst="rect">
@@ -7413,6 +7817,30 @@
           <a:xfrm>
             <a:off x="5229334" y="3163330"/>
             <a:ext cx="6730233" cy="3358719"/>
+          </a:xfrm>
+          <a:prstGeom prst="rect">
+            <a:avLst/>
+          </a:prstGeom>
+        </p:spPr>
+      </p:pic>
+      <p:pic>
+        <p:nvPicPr>
+          <p:cNvPr id="3" name="Picture 2"/>
+          <p:cNvPicPr>
+            <a:picLocks noChangeAspect="1"/>
+          </p:cNvPicPr>
+          <p:nvPr/>
+        </p:nvPicPr>
+        <p:blipFill>
+          <a:blip r:embed="rId6"/>
+          <a:stretch>
+            <a:fillRect/>
+          </a:stretch>
+        </p:blipFill>
+        <p:spPr>
+          <a:xfrm>
+            <a:off x="324000" y="5538559"/>
+            <a:ext cx="4640029" cy="602749"/>
           </a:xfrm>
           <a:prstGeom prst="rect">
             <a:avLst/>
@@ -7553,6 +7981,51 @@
                                           </p:stCondLst>
                                         </p:cTn>
                                         <p:tgtEl>
+                                          <p:spTgt spid="3"/>
+                                        </p:tgtEl>
+                                        <p:attrNameLst>
+                                          <p:attrName>style.visibility</p:attrName>
+                                        </p:attrNameLst>
+                                      </p:cBhvr>
+                                      <p:to>
+                                        <p:strVal val="visible"/>
+                                      </p:to>
+                                    </p:set>
+                                  </p:childTnLst>
+                                </p:cTn>
+                              </p:par>
+                            </p:childTnLst>
+                          </p:cTn>
+                        </p:par>
+                      </p:childTnLst>
+                    </p:cTn>
+                  </p:par>
+                  <p:par>
+                    <p:cTn id="15" fill="hold">
+                      <p:stCondLst>
+                        <p:cond delay="indefinite"/>
+                      </p:stCondLst>
+                      <p:childTnLst>
+                        <p:par>
+                          <p:cTn id="16" fill="hold">
+                            <p:stCondLst>
+                              <p:cond delay="0"/>
+                            </p:stCondLst>
+                            <p:childTnLst>
+                              <p:par>
+                                <p:cTn id="17" presetID="1" presetClass="entr" presetSubtype="0" fill="hold" nodeType="clickEffect">
+                                  <p:stCondLst>
+                                    <p:cond delay="0"/>
+                                  </p:stCondLst>
+                                  <p:childTnLst>
+                                    <p:set>
+                                      <p:cBhvr>
+                                        <p:cTn id="18" dur="1" fill="hold">
+                                          <p:stCondLst>
+                                            <p:cond delay="0"/>
+                                          </p:stCondLst>
+                                        </p:cTn>
+                                        <p:tgtEl>
                                           <p:spTgt spid="8"/>
                                         </p:tgtEl>
                                         <p:attrNameLst>
@@ -7597,90 +8070,6 @@
 </p:sld>
 </file>
 
-<file path=ppt/slides/slide4.xml><?xml version="1.0" encoding="utf-8"?>
-<p:sld xmlns:a="http://schemas.openxmlformats.org/drawingml/2006/main" xmlns:r="http://schemas.openxmlformats.org/officeDocument/2006/relationships" xmlns:p="http://schemas.openxmlformats.org/presentationml/2006/main">
-  <p:cSld>
-    <p:spTree>
-      <p:nvGrpSpPr>
-        <p:cNvPr id="1" name=""/>
-        <p:cNvGrpSpPr/>
-        <p:nvPr/>
-      </p:nvGrpSpPr>
-      <p:grpSpPr>
-        <a:xfrm>
-          <a:off x="0" y="0"/>
-          <a:ext cx="0" cy="0"/>
-          <a:chOff x="0" y="0"/>
-          <a:chExt cx="0" cy="0"/>
-        </a:xfrm>
-      </p:grpSpPr>
-      <p:sp>
-        <p:nvSpPr>
-          <p:cNvPr id="2" name="Title 1"/>
-          <p:cNvSpPr>
-            <a:spLocks noGrp="1"/>
-          </p:cNvSpPr>
-          <p:nvPr>
-            <p:ph type="title"/>
-          </p:nvPr>
-        </p:nvSpPr>
-        <p:spPr/>
-        <p:txBody>
-          <a:bodyPr/>
-          <a:lstStyle/>
-          <a:p>
-            <a:r>
-              <a:rPr lang="en-US" dirty="0" smtClean="0"/>
-              <a:t>Create button in Toolbar</a:t>
-            </a:r>
-            <a:endParaRPr lang="en-US" dirty="0"/>
-          </a:p>
-        </p:txBody>
-      </p:sp>
-      <p:pic>
-        <p:nvPicPr>
-          <p:cNvPr id="5" name="Picture 4"/>
-          <p:cNvPicPr>
-            <a:picLocks noChangeAspect="1"/>
-          </p:cNvPicPr>
-          <p:nvPr/>
-        </p:nvPicPr>
-        <p:blipFill>
-          <a:blip r:embed="rId2"/>
-          <a:stretch>
-            <a:fillRect/>
-          </a:stretch>
-        </p:blipFill>
-        <p:spPr>
-          <a:xfrm>
-            <a:off x="324000" y="1586908"/>
-            <a:ext cx="6828112" cy="4229467"/>
-          </a:xfrm>
-          <a:prstGeom prst="rect">
-            <a:avLst/>
-          </a:prstGeom>
-        </p:spPr>
-      </p:pic>
-    </p:spTree>
-    <p:extLst>
-      <p:ext uri="{BB962C8B-B14F-4D97-AF65-F5344CB8AC3E}">
-        <p14:creationId xmlns:p14="http://schemas.microsoft.com/office/powerpoint/2010/main" val="863351914"/>
-      </p:ext>
-    </p:extLst>
-  </p:cSld>
-  <p:clrMapOvr>
-    <a:masterClrMapping/>
-  </p:clrMapOvr>
-  <p:timing>
-    <p:tnLst>
-      <p:par>
-        <p:cTn id="1" dur="indefinite" restart="never" nodeType="tmRoot"/>
-      </p:par>
-    </p:tnLst>
-  </p:timing>
-</p:sld>
-</file>
-
 <file path=ppt/slides/slide5.xml><?xml version="1.0" encoding="utf-8"?>
 <p:sld xmlns:a="http://schemas.openxmlformats.org/drawingml/2006/main" xmlns:r="http://schemas.openxmlformats.org/officeDocument/2006/relationships" xmlns:p="http://schemas.openxmlformats.org/presentationml/2006/main">
   <p:cSld>
@@ -7715,7 +8104,7 @@
           <a:p>
             <a:r>
               <a:rPr lang="en-US" dirty="0" smtClean="0"/>
-              <a:t>Transaction Type popup</a:t>
+              <a:t>Create button in Toolbar</a:t>
             </a:r>
             <a:endParaRPr lang="en-US" dirty="0"/>
           </a:p>
@@ -7723,49 +8112,32 @@
       </p:sp>
       <p:pic>
         <p:nvPicPr>
-          <p:cNvPr id="1028" name="Picture 4" descr="C:\Users\i042416\AppData\Local\YNote\data\cle.ee@163.com\08010a75c1fe4f1fb2946fec8802aa9f\clipboard.png"/>
+          <p:cNvPr id="5" name="Picture 4"/>
           <p:cNvPicPr>
-            <a:picLocks noChangeAspect="1" noChangeArrowheads="1"/>
+            <a:picLocks noChangeAspect="1"/>
           </p:cNvPicPr>
           <p:nvPr/>
         </p:nvPicPr>
         <p:blipFill>
-          <a:blip r:embed="rId2">
-            <a:extLst>
-              <a:ext uri="{28A0092B-C50C-407E-A947-70E740481C1C}">
-                <a14:useLocalDpi xmlns:a14="http://schemas.microsoft.com/office/drawing/2010/main" val="0"/>
-              </a:ext>
-            </a:extLst>
-          </a:blip>
-          <a:srcRect/>
+          <a:blip r:embed="rId2"/>
           <a:stretch>
             <a:fillRect/>
           </a:stretch>
         </p:blipFill>
-        <p:spPr bwMode="auto">
-          <a:xfrm>
-            <a:off x="247692" y="1498657"/>
-            <a:ext cx="11697816" cy="4412464"/>
+        <p:spPr>
+          <a:xfrm>
+            <a:off x="324000" y="1586908"/>
+            <a:ext cx="6828112" cy="4229467"/>
           </a:xfrm>
           <a:prstGeom prst="rect">
             <a:avLst/>
           </a:prstGeom>
-          <a:noFill/>
-          <a:extLst>
-            <a:ext uri="{909E8E84-426E-40DD-AFC4-6F175D3DCCD1}">
-              <a14:hiddenFill xmlns:a14="http://schemas.microsoft.com/office/drawing/2010/main">
-                <a:solidFill>
-                  <a:srgbClr val="FFFFFF"/>
-                </a:solidFill>
-              </a14:hiddenFill>
-            </a:ext>
-          </a:extLst>
         </p:spPr>
       </p:pic>
     </p:spTree>
     <p:extLst>
       <p:ext uri="{BB962C8B-B14F-4D97-AF65-F5344CB8AC3E}">
-        <p14:creationId xmlns:p14="http://schemas.microsoft.com/office/powerpoint/2010/main" val="4188476722"/>
+        <p14:creationId xmlns:p14="http://schemas.microsoft.com/office/powerpoint/2010/main" val="863351914"/>
       </p:ext>
     </p:extLst>
   </p:cSld>
@@ -7816,7 +8188,7 @@
           <a:p>
             <a:r>
               <a:rPr lang="en-US" dirty="0" smtClean="0"/>
-              <a:t>1. BSP Application sends OData Request</a:t>
+              <a:t>Transaction Type popup</a:t>
             </a:r>
             <a:endParaRPr lang="en-US" dirty="0"/>
           </a:p>
@@ -7824,32 +8196,114 @@
       </p:sp>
       <p:pic>
         <p:nvPicPr>
-          <p:cNvPr id="5" name="Picture 4"/>
+          <p:cNvPr id="1028" name="Picture 4" descr="C:\Users\i042416\AppData\Local\YNote\data\cle.ee@163.com\08010a75c1fe4f1fb2946fec8802aa9f\clipboard.png"/>
           <p:cNvPicPr>
-            <a:picLocks noChangeAspect="1"/>
+            <a:picLocks noChangeAspect="1" noChangeArrowheads="1"/>
           </p:cNvPicPr>
           <p:nvPr/>
         </p:nvPicPr>
         <p:blipFill>
-          <a:blip r:embed="rId2"/>
+          <a:blip r:embed="rId2">
+            <a:extLst>
+              <a:ext uri="{28A0092B-C50C-407E-A947-70E740481C1C}">
+                <a14:useLocalDpi xmlns:a14="http://schemas.microsoft.com/office/drawing/2010/main" val="0"/>
+              </a:ext>
+            </a:extLst>
+          </a:blip>
+          <a:srcRect/>
           <a:stretch>
             <a:fillRect/>
           </a:stretch>
         </p:blipFill>
-        <p:spPr>
-          <a:xfrm>
-            <a:off x="546551" y="1406870"/>
-            <a:ext cx="11294071" cy="3647044"/>
+        <p:spPr bwMode="auto">
+          <a:xfrm>
+            <a:off x="247692" y="1498657"/>
+            <a:ext cx="11697816" cy="4259592"/>
           </a:xfrm>
           <a:prstGeom prst="rect">
             <a:avLst/>
           </a:prstGeom>
+          <a:noFill/>
+          <a:extLst>
+            <a:ext uri="{909E8E84-426E-40DD-AFC4-6F175D3DCCD1}">
+              <a14:hiddenFill xmlns:a14="http://schemas.microsoft.com/office/drawing/2010/main">
+                <a:solidFill>
+                  <a:srgbClr val="FFFFFF"/>
+                </a:solidFill>
+              </a14:hiddenFill>
+            </a:ext>
+          </a:extLst>
         </p:spPr>
       </p:pic>
+      <p:sp>
+        <p:nvSpPr>
+          <p:cNvPr id="3" name="TextBox 2"/>
+          <p:cNvSpPr txBox="1"/>
+          <p:nvPr/>
+        </p:nvSpPr>
+        <p:spPr>
+          <a:xfrm>
+            <a:off x="247692" y="5857103"/>
+            <a:ext cx="11697816" cy="630942"/>
+          </a:xfrm>
+          <a:prstGeom prst="rect">
+            <a:avLst/>
+          </a:prstGeom>
+          <a:noFill/>
+        </p:spPr>
+        <p:txBody>
+          <a:bodyPr wrap="square" lIns="0" tIns="0" rIns="0" bIns="0" rtlCol="0">
+            <a:spAutoFit/>
+          </a:bodyPr>
+          <a:lstStyle/>
+          <a:p>
+            <a:pPr fontAlgn="base">
+              <a:spcBef>
+                <a:spcPts val="600"/>
+              </a:spcBef>
+              <a:spcAft>
+                <a:spcPct val="0"/>
+              </a:spcAft>
+              <a:buClr>
+                <a:srgbClr val="F0AB00"/>
+              </a:buClr>
+              <a:buSzPct val="80000"/>
+            </a:pPr>
+            <a:r>
+              <a:rPr lang="en-US" sz="1800" b="1" kern="0" dirty="0" smtClean="0">
+                <a:ea typeface="Arial Unicode MS" pitchFamily="34" charset="-128"/>
+                <a:cs typeface="Arial Unicode MS" pitchFamily="34" charset="-128"/>
+              </a:rPr>
+              <a:t>GM4/001: frontend server </a:t>
+            </a:r>
+          </a:p>
+          <a:p>
+            <a:pPr fontAlgn="base">
+              <a:spcBef>
+                <a:spcPts val="600"/>
+              </a:spcBef>
+              <a:spcAft>
+                <a:spcPct val="0"/>
+              </a:spcAft>
+              <a:buClr>
+                <a:srgbClr val="F0AB00"/>
+              </a:buClr>
+              <a:buSzPct val="80000"/>
+            </a:pPr>
+            <a:r>
+              <a:rPr lang="en-US" sz="1800" b="1" kern="0" dirty="0" smtClean="0">
+                <a:ea typeface="Arial Unicode MS" pitchFamily="34" charset="-128"/>
+                <a:cs typeface="Arial Unicode MS" pitchFamily="34" charset="-128"/>
+              </a:rPr>
+              <a:t>QHD/504: backend server</a:t>
+            </a:r>
+          </a:p>
+        </p:txBody>
+      </p:sp>
     </p:spTree>
     <p:extLst>
       <p:ext uri="{BB962C8B-B14F-4D97-AF65-F5344CB8AC3E}">
-        <p14:creationId xmlns:p14="http://schemas.microsoft.com/office/powerpoint/2010/main" val="1987381018"/>
+        <p14:creationId xmlns:p14="http://schemas.microsoft.com/office/powerpoint/2010/main" val="4188476722"/>
       </p:ext>
     </p:extLst>
   </p:cSld>
@@ -7900,7 +8354,7 @@
           <a:p>
             <a:r>
               <a:rPr lang="en-US" dirty="0" smtClean="0"/>
-              <a:t>2. Gateway Frontend Add-on calls Trusted RFC to Backend</a:t>
+              <a:t>1. BSP Application sends OData Request</a:t>
             </a:r>
             <a:endParaRPr lang="en-US" dirty="0"/>
           </a:p>
@@ -7908,7 +8362,7 @@
       </p:sp>
       <p:pic>
         <p:nvPicPr>
-          <p:cNvPr id="6" name="Picture 5"/>
+          <p:cNvPr id="5" name="Picture 4"/>
           <p:cNvPicPr>
             <a:picLocks noChangeAspect="1"/>
           </p:cNvPicPr>
@@ -7922,32 +8376,8 @@
         </p:blipFill>
         <p:spPr>
           <a:xfrm>
-            <a:off x="7119189" y="1647243"/>
-            <a:ext cx="4580017" cy="2057578"/>
-          </a:xfrm>
-          <a:prstGeom prst="rect">
-            <a:avLst/>
-          </a:prstGeom>
-        </p:spPr>
-      </p:pic>
-      <p:pic>
-        <p:nvPicPr>
-          <p:cNvPr id="7" name="Picture 6"/>
-          <p:cNvPicPr>
-            <a:picLocks noChangeAspect="1"/>
-          </p:cNvPicPr>
-          <p:nvPr/>
-        </p:nvPicPr>
-        <p:blipFill>
-          <a:blip r:embed="rId3"/>
-          <a:stretch>
-            <a:fillRect/>
-          </a:stretch>
-        </p:blipFill>
-        <p:spPr>
-          <a:xfrm>
-            <a:off x="324000" y="1647243"/>
-            <a:ext cx="6576630" cy="3947502"/>
+            <a:off x="546551" y="1406870"/>
+            <a:ext cx="11294071" cy="3647044"/>
           </a:xfrm>
           <a:prstGeom prst="rect">
             <a:avLst/>
@@ -7957,13 +8387,20 @@
     </p:spTree>
     <p:extLst>
       <p:ext uri="{BB962C8B-B14F-4D97-AF65-F5344CB8AC3E}">
-        <p14:creationId xmlns:p14="http://schemas.microsoft.com/office/powerpoint/2010/main" val="993327824"/>
+        <p14:creationId xmlns:p14="http://schemas.microsoft.com/office/powerpoint/2010/main" val="1987381018"/>
       </p:ext>
     </p:extLst>
   </p:cSld>
   <p:clrMapOvr>
     <a:masterClrMapping/>
   </p:clrMapOvr>
+  <p:timing>
+    <p:tnLst>
+      <p:par>
+        <p:cTn id="1" dur="indefinite" restart="never" nodeType="tmRoot"/>
+      </p:par>
+    </p:tnLst>
+  </p:timing>
 </p:sld>
 </file>
 
@@ -8001,7 +8438,7 @@
           <a:p>
             <a:r>
               <a:rPr lang="en-US" dirty="0" smtClean="0"/>
-              <a:t>3. Gateway Backend Add-on Delegates to Service Provider</a:t>
+              <a:t>2. Gateway Frontend Add-on calls Trusted RFC to Backend</a:t>
             </a:r>
             <a:endParaRPr lang="en-US" dirty="0"/>
           </a:p>
@@ -8023,8 +8460,32 @@
         </p:blipFill>
         <p:spPr>
           <a:xfrm>
-            <a:off x="324000" y="1425560"/>
-            <a:ext cx="10950889" cy="4008467"/>
+            <a:off x="7119189" y="1647243"/>
+            <a:ext cx="4580017" cy="2057578"/>
+          </a:xfrm>
+          <a:prstGeom prst="rect">
+            <a:avLst/>
+          </a:prstGeom>
+        </p:spPr>
+      </p:pic>
+      <p:pic>
+        <p:nvPicPr>
+          <p:cNvPr id="7" name="Picture 6"/>
+          <p:cNvPicPr>
+            <a:picLocks noChangeAspect="1"/>
+          </p:cNvPicPr>
+          <p:nvPr/>
+        </p:nvPicPr>
+        <p:blipFill>
+          <a:blip r:embed="rId3"/>
+          <a:stretch>
+            <a:fillRect/>
+          </a:stretch>
+        </p:blipFill>
+        <p:spPr>
+          <a:xfrm>
+            <a:off x="324000" y="1647243"/>
+            <a:ext cx="6576630" cy="3947502"/>
           </a:xfrm>
           <a:prstGeom prst="rect">
             <a:avLst/>
@@ -8034,13 +8495,20 @@
     </p:spTree>
     <p:extLst>
       <p:ext uri="{BB962C8B-B14F-4D97-AF65-F5344CB8AC3E}">
-        <p14:creationId xmlns:p14="http://schemas.microsoft.com/office/powerpoint/2010/main" val="512084818"/>
+        <p14:creationId xmlns:p14="http://schemas.microsoft.com/office/powerpoint/2010/main" val="993327824"/>
       </p:ext>
     </p:extLst>
   </p:cSld>
   <p:clrMapOvr>
     <a:masterClrMapping/>
   </p:clrMapOvr>
+  <p:timing>
+    <p:tnLst>
+      <p:par>
+        <p:cTn id="1" dur="indefinite" restart="never" nodeType="tmRoot"/>
+      </p:par>
+    </p:tnLst>
+  </p:timing>
 </p:sld>
 </file>
 
@@ -8078,7 +8546,7 @@
           <a:p>
             <a:r>
               <a:rPr lang="en-US" dirty="0" smtClean="0"/>
-              <a:t>Response in ABAP Format</a:t>
+              <a:t>3. Gateway Backend Add-on Delegates to Service Provider</a:t>
             </a:r>
             <a:endParaRPr lang="en-US" dirty="0"/>
           </a:p>
@@ -8086,7 +8554,7 @@
       </p:sp>
       <p:pic>
         <p:nvPicPr>
-          <p:cNvPr id="5" name="Picture 4"/>
+          <p:cNvPr id="6" name="Picture 5"/>
           <p:cNvPicPr>
             <a:picLocks noChangeAspect="1"/>
           </p:cNvPicPr>
@@ -8100,32 +8568,8 @@
         </p:blipFill>
         <p:spPr>
           <a:xfrm>
-            <a:off x="6366454" y="2253259"/>
-            <a:ext cx="4488569" cy="1562235"/>
-          </a:xfrm>
-          <a:prstGeom prst="rect">
-            <a:avLst/>
-          </a:prstGeom>
-        </p:spPr>
-      </p:pic>
-      <p:pic>
-        <p:nvPicPr>
-          <p:cNvPr id="6" name="Picture 5"/>
-          <p:cNvPicPr>
-            <a:picLocks noChangeAspect="1"/>
-          </p:cNvPicPr>
-          <p:nvPr/>
-        </p:nvPicPr>
-        <p:blipFill>
-          <a:blip r:embed="rId3"/>
-          <a:stretch>
-            <a:fillRect/>
-          </a:stretch>
-        </p:blipFill>
-        <p:spPr>
-          <a:xfrm>
-            <a:off x="324000" y="1575518"/>
-            <a:ext cx="5624047" cy="3337849"/>
+            <a:off x="324000" y="1425560"/>
+            <a:ext cx="10950889" cy="4008467"/>
           </a:xfrm>
           <a:prstGeom prst="rect">
             <a:avLst/>
@@ -8135,13 +8579,20 @@
     </p:spTree>
     <p:extLst>
       <p:ext uri="{BB962C8B-B14F-4D97-AF65-F5344CB8AC3E}">
-        <p14:creationId xmlns:p14="http://schemas.microsoft.com/office/powerpoint/2010/main" val="252141420"/>
+        <p14:creationId xmlns:p14="http://schemas.microsoft.com/office/powerpoint/2010/main" val="512084818"/>
       </p:ext>
     </p:extLst>
   </p:cSld>
   <p:clrMapOvr>
     <a:masterClrMapping/>
   </p:clrMapOvr>
+  <p:timing>
+    <p:tnLst>
+      <p:par>
+        <p:cTn id="1" dur="indefinite" restart="never" nodeType="tmRoot"/>
+      </p:par>
+    </p:tnLst>
+  </p:timing>
 </p:sld>
 </file>
 

</xml_diff>